<commit_message>
David added v3 of PowerPoint slides
</commit_message>
<xml_diff>
--- a/Groopy Project Overview.pptx
+++ b/Groopy Project Overview.pptx
@@ -331,6 +331,18 @@
     </p:ext>
   </p:extLst>
 </p:presentation>
+</file>
+
+<file path=ppt/commentAuthors.xml><?xml version="1.0" encoding="utf-8"?>
+<p:cmAuthorLst xmlns:a="http://schemas.openxmlformats.org/drawingml/2006/main" xmlns:r="http://schemas.openxmlformats.org/officeDocument/2006/relationships" xmlns:p="http://schemas.openxmlformats.org/presentationml/2006/main">
+  <p:cmAuthor id="1" name="David Killian" initials="DK" lastIdx="1" clrIdx="0">
+    <p:extLst>
+      <p:ext uri="{19B8F6BF-5375-455C-9EA6-DF929625EA0E}">
+        <p15:presenceInfo xmlns:p15="http://schemas.microsoft.com/office/powerpoint/2012/main" userId="" providerId=""/>
+      </p:ext>
+    </p:extLst>
+  </p:cmAuthor>
+</p:cmAuthorLst>
 </file>
 
 <file path=ppt/notesMasters/notesMaster1.xml><?xml version="1.0" encoding="utf-8"?>
@@ -3018,7 +3030,7 @@
         <p:spPr>
           <a:xfrm>
             <a:off x="4337825" y="925550"/>
-            <a:ext cx="4516243" cy="5784743"/>
+            <a:ext cx="4516243" cy="6215630"/>
           </a:xfrm>
           <a:prstGeom prst="rect">
             <a:avLst/>
@@ -3040,7 +3052,7 @@
           <a:p>
             <a:pPr algn="ctr">
               <a:spcAft>
-                <a:spcPts val="1200"/>
+                <a:spcPts val="600"/>
               </a:spcAft>
               <a:defRPr sz="2100" b="1"/>
             </a:pPr>
@@ -3052,14 +3064,26 @@
               </a:rPr>
               <a:t>Welcome to </a:t>
             </a:r>
-          </a:p>
-          <a:p>
-            <a:pPr algn="ctr">
-              <a:spcAft>
-                <a:spcPts val="1200"/>
-              </a:spcAft>
-              <a:defRPr sz="2100" b="1"/>
-            </a:pPr>
+            <a:r>
+              <a:rPr lang="en-US" sz="3200" i="1" dirty="0">
+                <a:solidFill>
+                  <a:schemeClr val="accent6">
+                    <a:lumMod val="75000"/>
+                  </a:schemeClr>
+                </a:solidFill>
+                <a:effectLst>
+                  <a:outerShdw blurRad="25400" dist="50800" dir="2700000" algn="tl" rotWithShape="0">
+                    <a:prstClr val="black">
+                      <a:alpha val="40000"/>
+                    </a:prstClr>
+                  </a:outerShdw>
+                </a:effectLst>
+                <a:latin typeface="Arial" charset="0"/>
+                <a:ea typeface="Arial" charset="0"/>
+                <a:cs typeface="Arial" charset="0"/>
+              </a:rPr>
+              <a:t>g</a:t>
+            </a:r>
             <a:r>
               <a:rPr lang="en-US" sz="3200" i="1" dirty="0" smtClean="0">
                 <a:solidFill>
@@ -3078,13 +3102,38 @@
                 <a:ea typeface="Arial" charset="0"/>
                 <a:cs typeface="Arial" charset="0"/>
               </a:rPr>
-              <a:t>groopy </a:t>
+              <a:t>roopy</a:t>
             </a:r>
           </a:p>
           <a:p>
             <a:pPr algn="ctr">
               <a:spcAft>
-                <a:spcPts val="1200"/>
+                <a:spcPts val="600"/>
+              </a:spcAft>
+              <a:defRPr sz="2100" b="1"/>
+            </a:pPr>
+            <a:endParaRPr lang="en-US" sz="3200" i="1" dirty="0">
+              <a:solidFill>
+                <a:schemeClr val="accent6">
+                  <a:lumMod val="75000"/>
+                </a:schemeClr>
+              </a:solidFill>
+              <a:effectLst>
+                <a:outerShdw blurRad="25400" dist="50800" dir="2700000" algn="tl" rotWithShape="0">
+                  <a:prstClr val="black">
+                    <a:alpha val="40000"/>
+                  </a:prstClr>
+                </a:outerShdw>
+              </a:effectLst>
+              <a:latin typeface="Arial" charset="0"/>
+              <a:ea typeface="Arial" charset="0"/>
+              <a:cs typeface="Arial" charset="0"/>
+            </a:endParaRPr>
+          </a:p>
+          <a:p>
+            <a:pPr algn="ctr">
+              <a:spcAft>
+                <a:spcPts val="600"/>
               </a:spcAft>
               <a:defRPr sz="2100" b="1"/>
             </a:pPr>
@@ -3107,6 +3156,31 @@
             </a:endParaRPr>
           </a:p>
           <a:p>
+            <a:pPr algn="ctr">
+              <a:spcAft>
+                <a:spcPts val="600"/>
+              </a:spcAft>
+              <a:defRPr sz="2100" b="1"/>
+            </a:pPr>
+            <a:endParaRPr lang="en-US" sz="3200" i="1" dirty="0" smtClean="0">
+              <a:solidFill>
+                <a:schemeClr val="accent6">
+                  <a:lumMod val="75000"/>
+                </a:schemeClr>
+              </a:solidFill>
+              <a:effectLst>
+                <a:outerShdw blurRad="25400" dist="50800" dir="2700000" algn="tl" rotWithShape="0">
+                  <a:prstClr val="black">
+                    <a:alpha val="40000"/>
+                  </a:prstClr>
+                </a:outerShdw>
+              </a:effectLst>
+              <a:latin typeface="Arial" charset="0"/>
+              <a:ea typeface="Arial" charset="0"/>
+              <a:cs typeface="Arial" charset="0"/>
+            </a:endParaRPr>
+          </a:p>
+          <a:p>
             <a:pPr marL="342900" indent="-342900">
               <a:spcAft>
                 <a:spcPts val="1200"/>
@@ -3116,12 +3190,28 @@
               <a:defRPr sz="2100" b="1"/>
             </a:pPr>
             <a:r>
+              <a:rPr lang="en-US" i="1" dirty="0" smtClean="0">
+                <a:latin typeface="Arial" charset="0"/>
+                <a:ea typeface="Arial" charset="0"/>
+                <a:cs typeface="Arial" charset="0"/>
+              </a:rPr>
+              <a:t>A </a:t>
+            </a:r>
+            <a:r>
               <a:rPr lang="en-US" dirty="0" smtClean="0">
                 <a:latin typeface="Arial" charset="0"/>
                 <a:ea typeface="Arial" charset="0"/>
                 <a:cs typeface="Arial" charset="0"/>
               </a:rPr>
-              <a:t>Build </a:t>
+              <a:t>handy</a:t>
+            </a:r>
+            <a:r>
+              <a:rPr lang="en-US" i="1" dirty="0" smtClean="0">
+                <a:latin typeface="Arial" charset="0"/>
+                <a:ea typeface="Arial" charset="0"/>
+                <a:cs typeface="Arial" charset="0"/>
+              </a:rPr>
+              <a:t> </a:t>
             </a:r>
             <a:r>
               <a:rPr lang="en-US" dirty="0" smtClean="0">
@@ -3129,7 +3219,15 @@
                 <a:ea typeface="Arial" charset="0"/>
                 <a:cs typeface="Arial" charset="0"/>
               </a:rPr>
-              <a:t>an app to track </a:t>
+              <a:t>app </a:t>
+            </a:r>
+            <a:r>
+              <a:rPr lang="en-US" dirty="0" smtClean="0">
+                <a:latin typeface="Arial" charset="0"/>
+                <a:ea typeface="Arial" charset="0"/>
+                <a:cs typeface="Arial" charset="0"/>
+              </a:rPr>
+              <a:t>to track </a:t>
             </a:r>
             <a:r>
               <a:rPr lang="en-US" i="1" dirty="0" smtClean="0">
@@ -3246,6 +3344,262 @@
           </a:prstGeom>
         </p:spPr>
       </p:pic>
+      <p:sp>
+        <p:nvSpPr>
+          <p:cNvPr id="4" name="Rounded Rectangular Callout 3"/>
+          <p:cNvSpPr/>
+          <p:nvPr/>
+        </p:nvSpPr>
+        <p:spPr>
+          <a:xfrm>
+            <a:off x="4315523" y="1739338"/>
+            <a:ext cx="4783873" cy="1089658"/>
+          </a:xfrm>
+          <a:prstGeom prst="wedgeRoundRectCallout">
+            <a:avLst>
+              <a:gd name="adj1" fmla="val 8638"/>
+              <a:gd name="adj2" fmla="val -72407"/>
+              <a:gd name="adj3" fmla="val 16667"/>
+            </a:avLst>
+          </a:prstGeom>
+          <a:solidFill>
+            <a:schemeClr val="tx2">
+              <a:lumMod val="20000"/>
+              <a:lumOff val="80000"/>
+            </a:schemeClr>
+          </a:solidFill>
+          <a:ln w="9525" cap="flat">
+            <a:solidFill>
+              <a:schemeClr val="tx2"/>
+            </a:solidFill>
+            <a:prstDash val="solid"/>
+            <a:round/>
+          </a:ln>
+          <a:effectLst>
+            <a:outerShdw blurRad="50800" dist="76200" dir="2700000" algn="tl" rotWithShape="0">
+              <a:prstClr val="black">
+                <a:alpha val="40000"/>
+              </a:prstClr>
+            </a:outerShdw>
+          </a:effectLst>
+          <a:sp3d/>
+        </p:spPr>
+        <p:style>
+          <a:lnRef idx="0">
+            <a:scrgbClr r="0" g="0" b="0"/>
+          </a:lnRef>
+          <a:fillRef idx="0">
+            <a:scrgbClr r="0" g="0" b="0"/>
+          </a:fillRef>
+          <a:effectRef idx="0">
+            <a:scrgbClr r="0" g="0" b="0"/>
+          </a:effectRef>
+          <a:fontRef idx="none"/>
+        </p:style>
+        <p:txBody>
+          <a:bodyPr rot="0" spcFirstLastPara="1" vertOverflow="overflow" horzOverflow="overflow" vert="horz" wrap="square" lIns="45719" tIns="45719" rIns="45719" bIns="45719" numCol="1" spcCol="38100" rtlCol="0" anchor="t">
+            <a:spAutoFit/>
+          </a:bodyPr>
+          <a:lstStyle/>
+          <a:p>
+            <a:pPr marL="0" marR="0" indent="0" algn="l" defTabSz="914400" rtl="0" fontAlgn="auto" latinLnBrk="0" hangingPunct="0">
+              <a:lnSpc>
+                <a:spcPct val="100000"/>
+              </a:lnSpc>
+              <a:spcBef>
+                <a:spcPts val="0"/>
+              </a:spcBef>
+              <a:spcAft>
+                <a:spcPts val="0"/>
+              </a:spcAft>
+              <a:buClrTx/>
+              <a:buSzTx/>
+              <a:buFontTx/>
+              <a:buNone/>
+              <a:tabLst/>
+            </a:pPr>
+            <a:r>
+              <a:rPr kumimoji="0" lang="en-US" sz="1600" b="0" i="0" u="none" strike="noStrike" cap="none" spc="0" normalizeH="0" baseline="0" dirty="0" smtClean="0">
+                <a:ln>
+                  <a:noFill/>
+                </a:ln>
+                <a:solidFill>
+                  <a:schemeClr val="tx2">
+                    <a:lumMod val="75000"/>
+                  </a:schemeClr>
+                </a:solidFill>
+                <a:effectLst/>
+                <a:uFillTx/>
+                <a:latin typeface="+mj-lt"/>
+                <a:ea typeface="+mj-ea"/>
+                <a:cs typeface="+mj-cs"/>
+                <a:sym typeface="Arial"/>
+              </a:rPr>
+              <a:t>Dictionary</a:t>
+            </a:r>
+          </a:p>
+          <a:p>
+            <a:pPr marL="0" marR="0" indent="0" algn="l" defTabSz="914400" rtl="0" fontAlgn="auto" latinLnBrk="0" hangingPunct="0">
+              <a:lnSpc>
+                <a:spcPct val="100000"/>
+              </a:lnSpc>
+              <a:spcBef>
+                <a:spcPts val="0"/>
+              </a:spcBef>
+              <a:spcAft>
+                <a:spcPts val="0"/>
+              </a:spcAft>
+              <a:buClrTx/>
+              <a:buSzTx/>
+              <a:buFontTx/>
+              <a:buNone/>
+              <a:tabLst/>
+            </a:pPr>
+            <a:r>
+              <a:rPr lang="en-US" sz="1400" b="1" dirty="0"/>
+              <a:t>g</a:t>
+            </a:r>
+            <a:r>
+              <a:rPr lang="en-US" sz="1400" b="1" dirty="0" smtClean="0"/>
+              <a:t>roupie</a:t>
+            </a:r>
+            <a:r>
+              <a:rPr lang="en-US" sz="1400" dirty="0" smtClean="0"/>
+              <a:t> </a:t>
+            </a:r>
+            <a:r>
+              <a:rPr lang="en-US" sz="1400" dirty="0" smtClean="0">
+                <a:solidFill>
+                  <a:schemeClr val="bg1">
+                    <a:lumMod val="40000"/>
+                    <a:lumOff val="60000"/>
+                  </a:schemeClr>
+                </a:solidFill>
+              </a:rPr>
+              <a:t>| ‘grü-pē | </a:t>
+            </a:r>
+            <a:r>
+              <a:rPr lang="en-US" sz="1400" dirty="0" smtClean="0"/>
+              <a:t>noun </a:t>
+            </a:r>
+            <a:r>
+              <a:rPr lang="en-US" sz="1400" i="1" dirty="0" smtClean="0">
+                <a:solidFill>
+                  <a:schemeClr val="bg1">
+                    <a:lumMod val="40000"/>
+                    <a:lumOff val="60000"/>
+                  </a:schemeClr>
+                </a:solidFill>
+              </a:rPr>
+              <a:t>informal</a:t>
+            </a:r>
+          </a:p>
+          <a:p>
+            <a:pPr marL="0" marR="0" indent="0" algn="l" defTabSz="914400" rtl="0" fontAlgn="auto" latinLnBrk="0" hangingPunct="0">
+              <a:lnSpc>
+                <a:spcPct val="100000"/>
+              </a:lnSpc>
+              <a:spcBef>
+                <a:spcPts val="0"/>
+              </a:spcBef>
+              <a:spcAft>
+                <a:spcPts val="0"/>
+              </a:spcAft>
+              <a:buClrTx/>
+              <a:buSzTx/>
+              <a:buFontTx/>
+              <a:buNone/>
+              <a:tabLst/>
+            </a:pPr>
+            <a:r>
+              <a:rPr kumimoji="0" lang="en-US" sz="1300" b="0" i="0" u="none" strike="noStrike" cap="none" spc="0" normalizeH="0" baseline="0" dirty="0" smtClean="0">
+                <a:ln>
+                  <a:noFill/>
+                </a:ln>
+                <a:solidFill>
+                  <a:srgbClr val="000000"/>
+                </a:solidFill>
+                <a:effectLst/>
+                <a:uFillTx/>
+                <a:latin typeface="+mj-lt"/>
+                <a:ea typeface="+mj-ea"/>
+                <a:cs typeface="+mj-cs"/>
+                <a:sym typeface="Arial"/>
+              </a:rPr>
+              <a:t>A</a:t>
+            </a:r>
+            <a:r>
+              <a:rPr kumimoji="0" lang="en-US" sz="1300" b="0" i="0" u="none" strike="noStrike" cap="none" spc="0" normalizeH="0" dirty="0" smtClean="0">
+                <a:ln>
+                  <a:noFill/>
+                </a:ln>
+                <a:solidFill>
+                  <a:srgbClr val="000000"/>
+                </a:solidFill>
+                <a:effectLst/>
+                <a:uFillTx/>
+                <a:latin typeface="+mj-lt"/>
+                <a:ea typeface="+mj-ea"/>
+                <a:cs typeface="+mj-cs"/>
+                <a:sym typeface="Arial"/>
+              </a:rPr>
+              <a:t> person who regularly follows a pop music or other celebrity in the hope of meeting or getting to know them.</a:t>
+            </a:r>
+            <a:endParaRPr kumimoji="0" lang="en-US" sz="1300" b="0" i="0" u="none" strike="noStrike" cap="none" spc="0" normalizeH="0" baseline="0" dirty="0">
+              <a:ln>
+                <a:noFill/>
+              </a:ln>
+              <a:solidFill>
+                <a:srgbClr val="000000"/>
+              </a:solidFill>
+              <a:effectLst/>
+              <a:uFillTx/>
+              <a:latin typeface="+mj-lt"/>
+              <a:ea typeface="+mj-ea"/>
+              <a:cs typeface="+mj-cs"/>
+              <a:sym typeface="Arial"/>
+            </a:endParaRPr>
+          </a:p>
+        </p:txBody>
+      </p:sp>
+      <p:cxnSp>
+        <p:nvCxnSpPr>
+          <p:cNvPr id="6" name="Straight Connector 5"/>
+          <p:cNvCxnSpPr/>
+          <p:nvPr/>
+        </p:nvCxnSpPr>
+        <p:spPr>
+          <a:xfrm>
+            <a:off x="5374888" y="1973766"/>
+            <a:ext cx="3579541" cy="0"/>
+          </a:xfrm>
+          <a:prstGeom prst="line">
+            <a:avLst/>
+          </a:prstGeom>
+          <a:noFill/>
+          <a:ln w="9525" cap="flat">
+            <a:solidFill>
+              <a:schemeClr val="tx2"/>
+            </a:solidFill>
+            <a:prstDash val="solid"/>
+            <a:round/>
+          </a:ln>
+          <a:effectLst/>
+          <a:sp3d/>
+        </p:spPr>
+        <p:style>
+          <a:lnRef idx="0">
+            <a:scrgbClr r="0" g="0" b="0"/>
+          </a:lnRef>
+          <a:fillRef idx="0">
+            <a:scrgbClr r="0" g="0" b="0"/>
+          </a:fillRef>
+          <a:effectRef idx="0">
+            <a:scrgbClr r="0" g="0" b="0"/>
+          </a:effectRef>
+          <a:fontRef idx="none"/>
+        </p:style>
+      </p:cxnSp>
     </p:spTree>
   </p:cSld>
   <p:clrMapOvr>
@@ -3719,15 +4073,7 @@
                 <a:ea typeface="Arial" charset="0"/>
                 <a:cs typeface="Arial" charset="0"/>
               </a:rPr>
-              <a:t>Exception </a:t>
-            </a:r>
-            <a:r>
-              <a:rPr lang="en-US" dirty="0" smtClean="0">
-                <a:latin typeface="Arial" charset="0"/>
-                <a:ea typeface="Arial" charset="0"/>
-                <a:cs typeface="Arial" charset="0"/>
-              </a:rPr>
-              <a:t>handling</a:t>
+              <a:t>Exception handling</a:t>
             </a:r>
           </a:p>
           <a:p>
@@ -3747,11 +4093,6 @@
               </a:rPr>
               <a:t>Data fidelity (affiliates, ‘events’) </a:t>
             </a:r>
-            <a:endParaRPr lang="en-US" dirty="0" smtClean="0">
-              <a:latin typeface="Arial" charset="0"/>
-              <a:ea typeface="Arial" charset="0"/>
-              <a:cs typeface="Arial" charset="0"/>
-            </a:endParaRPr>
           </a:p>
           <a:p>
             <a:pPr marL="342900" indent="-342900">

</xml_diff>